<commit_message>
+ Ajout de ma partie de la présentation finale.
</commit_message>
<xml_diff>
--- a/documents/v2.0/Presentation_partie_Lazhar.pptx
+++ b/documents/v2.0/Presentation_partie_Lazhar.pptx
@@ -14170,11 +14170,7 @@
             </a:pPr>
             <a:r>
               <a:rPr lang="fr-CH" sz="2800" u="none" dirty="0" smtClean="0"/>
-              <a:t>  </a:t>
-            </a:r>
-            <a:r>
-              <a:rPr lang="fr-CH" sz="2800" u="none" dirty="0" smtClean="0"/>
-              <a:t>Transparent</a:t>
+              <a:t>  Transparent</a:t>
             </a:r>
           </a:p>
           <a:p>
@@ -14187,11 +14183,7 @@
             </a:pPr>
             <a:r>
               <a:rPr lang="fr-CH" sz="2800" u="none" dirty="0" smtClean="0"/>
-              <a:t> </a:t>
-            </a:r>
-            <a:r>
-              <a:rPr lang="fr-CH" sz="2800" u="none" dirty="0" smtClean="0"/>
-              <a:t> Simple</a:t>
+              <a:t>  Simple</a:t>
             </a:r>
           </a:p>
           <a:p>
@@ -14204,11 +14196,7 @@
             </a:pPr>
             <a:r>
               <a:rPr lang="fr-CH" sz="2800" u="none" dirty="0" smtClean="0"/>
-              <a:t> </a:t>
-            </a:r>
-            <a:r>
-              <a:rPr lang="fr-CH" sz="2800" u="none" dirty="0" smtClean="0"/>
-              <a:t> Interactif</a:t>
+              <a:t>  Interactif</a:t>
             </a:r>
           </a:p>
           <a:p>
@@ -14221,11 +14209,7 @@
             </a:pPr>
             <a:r>
               <a:rPr lang="fr-CH" sz="2800" u="none" dirty="0" smtClean="0"/>
-              <a:t> </a:t>
-            </a:r>
-            <a:r>
-              <a:rPr lang="fr-CH" sz="2800" u="none" dirty="0" smtClean="0"/>
-              <a:t> Portable</a:t>
+              <a:t>  Portable</a:t>
             </a:r>
           </a:p>
           <a:p>
@@ -14238,11 +14222,7 @@
             </a:pPr>
             <a:r>
               <a:rPr lang="fr-CH" sz="2800" u="none" dirty="0" smtClean="0"/>
-              <a:t> </a:t>
-            </a:r>
-            <a:r>
-              <a:rPr lang="fr-CH" sz="2800" u="none" dirty="0" smtClean="0"/>
-              <a:t> Léger</a:t>
+              <a:t>  Léger</a:t>
             </a:r>
           </a:p>
           <a:p>
@@ -14255,11 +14235,7 @@
             </a:pPr>
             <a:r>
               <a:rPr lang="fr-CH" sz="2800" u="none" dirty="0" smtClean="0"/>
-              <a:t> </a:t>
-            </a:r>
-            <a:r>
-              <a:rPr lang="fr-CH" sz="2800" u="none" dirty="0" smtClean="0"/>
-              <a:t> Evolutif</a:t>
+              <a:t>  Evolutif</a:t>
             </a:r>
           </a:p>
           <a:p>
@@ -14272,11 +14248,7 @@
             </a:pPr>
             <a:r>
               <a:rPr lang="fr-CH" sz="2800" u="none" dirty="0" smtClean="0"/>
-              <a:t> </a:t>
-            </a:r>
-            <a:r>
-              <a:rPr lang="fr-CH" sz="2800" u="none" dirty="0" smtClean="0"/>
-              <a:t> Mobile</a:t>
+              <a:t>  Mobile</a:t>
             </a:r>
           </a:p>
           <a:p>
@@ -14289,11 +14261,7 @@
             </a:pPr>
             <a:r>
               <a:rPr lang="fr-CH" sz="2800" u="none" dirty="0" smtClean="0"/>
-              <a:t> </a:t>
-            </a:r>
-            <a:r>
-              <a:rPr lang="fr-CH" sz="2800" u="none" dirty="0" smtClean="0"/>
-              <a:t> Décentralisé</a:t>
+              <a:t>  Décentralisé</a:t>
             </a:r>
           </a:p>
           <a:p>
@@ -14306,11 +14274,7 @@
             </a:pPr>
             <a:r>
               <a:rPr lang="fr-CH" sz="2800" u="none" dirty="0" smtClean="0"/>
-              <a:t> </a:t>
-            </a:r>
-            <a:r>
-              <a:rPr lang="fr-CH" sz="2800" u="none" dirty="0" smtClean="0"/>
-              <a:t> Visible</a:t>
+              <a:t>  Visible</a:t>
             </a:r>
           </a:p>
           <a:p>
@@ -14323,16 +14287,37 @@
             </a:pPr>
             <a:r>
               <a:rPr lang="fr-CH" sz="2800" u="none" dirty="0" smtClean="0"/>
-              <a:t> </a:t>
-            </a:r>
-            <a:r>
-              <a:rPr lang="fr-CH" sz="2800" u="none" dirty="0" smtClean="0"/>
-              <a:t> Commun</a:t>
-            </a:r>
-            <a:endParaRPr lang="fr-CH" sz="2800" u="none" dirty="0" smtClean="0"/>
-          </a:p>
-        </p:txBody>
-      </p:sp>
+              <a:t>  Commun</a:t>
+            </a:r>
+          </a:p>
+        </p:txBody>
+      </p:sp>
+      <p:pic>
+        <p:nvPicPr>
+          <p:cNvPr id="32" name="Image 61" descr="araignee.png"/>
+          <p:cNvPicPr>
+            <a:picLocks noChangeAspect="1" noChangeArrowheads="1"/>
+          </p:cNvPicPr>
+          <p:nvPr/>
+        </p:nvPicPr>
+        <p:blipFill>
+          <a:blip r:embed="rId4" cstate="print"/>
+          <a:srcRect/>
+          <a:stretch>
+            <a:fillRect/>
+          </a:stretch>
+        </p:blipFill>
+        <p:spPr bwMode="auto">
+          <a:xfrm>
+            <a:off x="4497755" y="2056374"/>
+            <a:ext cx="110249" cy="110249"/>
+          </a:xfrm>
+          <a:prstGeom prst="rect">
+            <a:avLst/>
+          </a:prstGeom>
+          <a:noFill/>
+        </p:spPr>
+      </p:pic>
     </p:spTree>
   </p:cSld>
   <p:clrMapOvr>

</xml_diff>